<commit_message>
updates for a bug
drawio and pdf and ppt
</commit_message>
<xml_diff>
--- a/Research paper/Geo Encryption Algorithm - Presentation.pptx
+++ b/Research paper/Geo Encryption Algorithm - Presentation.pptx
@@ -465,7 +465,7 @@
             <a:fld id="{5923F103-BC34-4FE4-A40E-EDDEECFDA5D0}" type="datetimeFigureOut">
               <a:rPr lang="en-US" dirty="0"/>
               <a:pPr/>
-              <a:t>3/21/2019</a:t>
+              <a:t>4/9/2019</a:t>
             </a:fld>
             <a:endParaRPr lang="en-US" dirty="0"/>
           </a:p>
@@ -1553,7 +1553,7 @@
           <a:p>
             <a:fld id="{923A1CC3-2375-41D4-9E03-427CAF2A4C1A}" type="datetimeFigureOut">
               <a:rPr lang="en-US" dirty="0"/>
-              <a:t>3/21/2019</a:t>
+              <a:t>4/9/2019</a:t>
             </a:fld>
             <a:endParaRPr lang="en-US" dirty="0"/>
           </a:p>
@@ -2533,7 +2533,7 @@
           <a:p>
             <a:fld id="{AFF16868-8199-4C2C-A5B1-63AEE139F88E}" type="datetimeFigureOut">
               <a:rPr lang="en-US" dirty="0"/>
-              <a:t>3/21/2019</a:t>
+              <a:t>4/9/2019</a:t>
             </a:fld>
             <a:endParaRPr lang="en-US" dirty="0"/>
           </a:p>
@@ -3667,7 +3667,7 @@
           <a:p>
             <a:fld id="{AAD9FF7F-6988-44CC-821B-644E70CD2F73}" type="datetimeFigureOut">
               <a:rPr lang="en-US" dirty="0"/>
-              <a:t>3/21/2019</a:t>
+              <a:t>4/9/2019</a:t>
             </a:fld>
             <a:endParaRPr lang="en-US" dirty="0"/>
           </a:p>
@@ -4700,7 +4700,7 @@
           <a:p>
             <a:fld id="{5C12C299-16B2-4475-990D-751901EACC14}" type="datetimeFigureOut">
               <a:rPr lang="en-US" dirty="0"/>
-              <a:t>3/21/2019</a:t>
+              <a:t>4/9/2019</a:t>
             </a:fld>
             <a:endParaRPr lang="en-US" dirty="0"/>
           </a:p>
@@ -5360,7 +5360,7 @@
           <a:p>
             <a:fld id="{9FE86839-B9D8-4651-8783-F325ECE74E65}" type="datetimeFigureOut">
               <a:rPr lang="en-US" dirty="0"/>
-              <a:t>3/21/2019</a:t>
+              <a:t>4/9/2019</a:t>
             </a:fld>
             <a:endParaRPr lang="en-US" dirty="0"/>
           </a:p>
@@ -6221,7 +6221,7 @@
           <a:p>
             <a:fld id="{FD484F64-32F6-45C5-931F-ADC1662401D0}" type="datetimeFigureOut">
               <a:rPr lang="en-US" dirty="0"/>
-              <a:t>3/21/2019</a:t>
+              <a:t>4/9/2019</a:t>
             </a:fld>
             <a:endParaRPr lang="en-US" dirty="0"/>
           </a:p>
@@ -6411,7 +6411,7 @@
           <a:p>
             <a:fld id="{53086D93-FCAC-47E0-A2EE-787E62CA814C}" type="datetimeFigureOut">
               <a:rPr lang="en-US" dirty="0"/>
-              <a:t>3/21/2019</a:t>
+              <a:t>4/9/2019</a:t>
             </a:fld>
             <a:endParaRPr lang="en-US" dirty="0"/>
           </a:p>
@@ -7383,7 +7383,7 @@
           <a:p>
             <a:fld id="{CDA879A6-0FD0-4734-A311-86BFCA472E6E}" type="datetimeFigureOut">
               <a:rPr lang="en-US" dirty="0"/>
-              <a:t>3/21/2019</a:t>
+              <a:t>4/9/2019</a:t>
             </a:fld>
             <a:endParaRPr lang="en-US" dirty="0"/>
           </a:p>
@@ -7594,7 +7594,7 @@
           <a:p>
             <a:fld id="{19C9CA7B-DFD4-44B5-8C60-D14B8CD1FB59}" type="datetimeFigureOut">
               <a:rPr lang="en-US" dirty="0"/>
-              <a:t>3/21/2019</a:t>
+              <a:t>4/9/2019</a:t>
             </a:fld>
             <a:endParaRPr lang="en-US" dirty="0"/>
           </a:p>
@@ -8628,7 +8628,7 @@
           <a:p>
             <a:fld id="{F34E6425-0181-43F2-84FC-787E803FD2F8}" type="datetimeFigureOut">
               <a:rPr lang="en-US" dirty="0"/>
-              <a:t>3/21/2019</a:t>
+              <a:t>4/9/2019</a:t>
             </a:fld>
             <a:endParaRPr lang="en-US" dirty="0"/>
           </a:p>
@@ -8900,7 +8900,7 @@
           <a:p>
             <a:fld id="{3BDB8791-F1B0-41E7-B7FD-A781E65C4266}" type="datetimeFigureOut">
               <a:rPr lang="en-US" dirty="0"/>
-              <a:t>3/21/2019</a:t>
+              <a:t>4/9/2019</a:t>
             </a:fld>
             <a:endParaRPr lang="en-US" dirty="0"/>
           </a:p>
@@ -9310,7 +9310,7 @@
           <a:p>
             <a:fld id="{5FDD63B2-E120-4ED8-B27B-C685F510A5FE}" type="datetimeFigureOut">
               <a:rPr lang="en-US" dirty="0"/>
-              <a:t>3/21/2019</a:t>
+              <a:t>4/9/2019</a:t>
             </a:fld>
             <a:endParaRPr lang="en-US" dirty="0"/>
           </a:p>
@@ -9437,7 +9437,7 @@
           <a:p>
             <a:fld id="{7AA18ACC-A947-437B-A130-35BD54FDF1E9}" type="datetimeFigureOut">
               <a:rPr lang="en-US" dirty="0"/>
-              <a:t>3/21/2019</a:t>
+              <a:t>4/9/2019</a:t>
             </a:fld>
             <a:endParaRPr lang="en-US" dirty="0"/>
           </a:p>
@@ -9532,7 +9532,7 @@
           <a:p>
             <a:fld id="{7C8D7E02-BCB8-4D50-A234-369438C08659}" type="datetimeFigureOut">
               <a:rPr lang="en-US" dirty="0"/>
-              <a:t>3/21/2019</a:t>
+              <a:t>4/9/2019</a:t>
             </a:fld>
             <a:endParaRPr lang="en-US" dirty="0"/>
           </a:p>
@@ -10613,7 +10613,7 @@
           <a:p>
             <a:fld id="{76E86A4C-8E40-4F87-A4F0-01A0687C5742}" type="datetimeFigureOut">
               <a:rPr lang="en-US" dirty="0"/>
-              <a:t>3/21/2019</a:t>
+              <a:t>4/9/2019</a:t>
             </a:fld>
             <a:endParaRPr lang="en-US" dirty="0"/>
           </a:p>
@@ -11721,7 +11721,7 @@
           <a:p>
             <a:fld id="{35E72C73-2D91-4E12-BA25-F0AA0C03599B}" type="datetimeFigureOut">
               <a:rPr lang="en-US" dirty="0"/>
-              <a:t>3/21/2019</a:t>
+              <a:t>4/9/2019</a:t>
             </a:fld>
             <a:endParaRPr lang="en-US" dirty="0"/>
           </a:p>
@@ -12718,7 +12718,7 @@
           <a:p>
             <a:fld id="{2BE451C3-0FF4-47C4-B829-773ADF60F88C}" type="datetimeFigureOut">
               <a:rPr lang="en-US" dirty="0"/>
-              <a:t>3/21/2019</a:t>
+              <a:t>4/9/2019</a:t>
             </a:fld>
             <a:endParaRPr lang="en-US" dirty="0"/>
           </a:p>
@@ -14556,7 +14556,7 @@
                 <a:latin typeface="Segoe UI" panose="020B0502040204020203" pitchFamily="34" charset="0"/>
                 <a:cs typeface="Segoe UI" panose="020B0502040204020203" pitchFamily="34" charset="0"/>
               </a:rPr>
-              <a:t>newFloatXY</a:t>
+              <a:t>newFloatXYXor</a:t>
             </a:r>
             <a:r>
               <a:rPr lang="en-IN" dirty="0">
@@ -14578,6 +14578,36 @@
                 <a:cs typeface="Segoe UI" panose="020B0502040204020203" pitchFamily="34" charset="0"/>
               </a:rPr>
               <a:t> + diff = 33809+48 = 33857</a:t>
+            </a:r>
+          </a:p>
+          <a:p>
+            <a:r>
+              <a:rPr lang="en-IN" dirty="0" err="1">
+                <a:latin typeface="Segoe UI" panose="020B0502040204020203" pitchFamily="34" charset="0"/>
+                <a:cs typeface="Segoe UI" panose="020B0502040204020203" pitchFamily="34" charset="0"/>
+              </a:rPr>
+              <a:t>newFloatXY</a:t>
+            </a:r>
+            <a:r>
+              <a:rPr lang="en-IN" dirty="0">
+                <a:latin typeface="Segoe UI" panose="020B0502040204020203" pitchFamily="34" charset="0"/>
+                <a:cs typeface="Segoe UI" panose="020B0502040204020203" pitchFamily="34" charset="0"/>
+              </a:rPr>
+              <a:t> = </a:t>
+            </a:r>
+            <a:r>
+              <a:rPr lang="en-IN" dirty="0" err="1">
+                <a:latin typeface="Segoe UI" panose="020B0502040204020203" pitchFamily="34" charset="0"/>
+                <a:cs typeface="Segoe UI" panose="020B0502040204020203" pitchFamily="34" charset="0"/>
+              </a:rPr>
+              <a:t>newFloatXYXor</a:t>
+            </a:r>
+            <a:r>
+              <a:rPr lang="en-IN" dirty="0">
+                <a:latin typeface="Segoe UI" panose="020B0502040204020203" pitchFamily="34" charset="0"/>
+                <a:cs typeface="Segoe UI" panose="020B0502040204020203" pitchFamily="34" charset="0"/>
+              </a:rPr>
+              <a:t> ^ key = 6171</a:t>
             </a:r>
           </a:p>
           <a:p>
@@ -14958,7 +14988,7 @@
         </p:blipFill>
         <p:spPr>
           <a:xfrm>
-            <a:off x="494522" y="466530"/>
+            <a:off x="494522" y="457199"/>
             <a:ext cx="11206066" cy="5906278"/>
           </a:xfrm>
           <a:prstGeom prst="rect">

</xml_diff>